<commit_message>
Added Food Amounts to Meal Descriptions
</commit_message>
<xml_diff>
--- a/daycare-presentation.pptx
+++ b/daycare-presentation.pptx
@@ -5744,7 +5744,7 @@
             </a:pPr>
             <a:r>
               <a:rPr lang="en-US" dirty="0"/>
-              <a:t>This is an log for daycare providers to enter in the information for each child. It will track items such as naps, foods, and diaper changes.</a:t>
+              <a:t>This is a log for daycare providers to enter in the information for each child. It will track items such as naps, foods, and diaper changes.</a:t>
             </a:r>
             <a:endParaRPr lang="en" dirty="0"/>
           </a:p>
@@ -5849,9 +5849,10 @@
               <a:buChar char="●"/>
             </a:pPr>
             <a:r>
-              <a:rPr lang="en" dirty="0"/>
-              <a:t>Feature 1</a:t>
+              <a:rPr lang="en-US" dirty="0"/>
+              <a:t>Ability to add classrooms and select if that particular class will need the infant form or toddler form</a:t>
             </a:r>
+            <a:endParaRPr lang="en" dirty="0"/>
           </a:p>
           <a:p>
             <a:pPr marL="457200" lvl="0" indent="-342900" rtl="0">
@@ -5866,8 +5867,13 @@
             </a:pPr>
             <a:r>
               <a:rPr lang="en" dirty="0"/>
-              <a:t>Feature 2</a:t>
+              <a:t>Ability to track meal times, </a:t>
             </a:r>
+            <a:r>
+              <a:rPr lang="en-US" dirty="0"/>
+              <a:t>what they ate, and the amount they consumed</a:t>
+            </a:r>
+            <a:endParaRPr lang="en" dirty="0"/>
           </a:p>
           <a:p>
             <a:pPr marL="457200" lvl="0" indent="-342900">
@@ -5879,8 +5885,13 @@
             </a:pPr>
             <a:r>
               <a:rPr lang="en" dirty="0"/>
-              <a:t>Feature 3</a:t>
+              <a:t>Ability to track bottle feeding </a:t>
             </a:r>
+            <a:r>
+              <a:rPr lang="en-US" dirty="0"/>
+              <a:t>times and ounces consumed</a:t>
+            </a:r>
+            <a:endParaRPr lang="en" dirty="0"/>
           </a:p>
         </p:txBody>
       </p:sp>
@@ -5980,7 +5991,7 @@
             </a:pPr>
             <a:r>
               <a:rPr lang="en-US" dirty="0"/>
-              <a:t>Admins can add students and assign them to certain classrooms.</a:t>
+              <a:t>Users can add students and assign them to certain classrooms.</a:t>
             </a:r>
           </a:p>
           <a:p>
@@ -5992,7 +6003,19 @@
             </a:pPr>
             <a:r>
               <a:rPr lang="en-US" dirty="0"/>
-              <a:t>Admins can fill out a daily log each day for all students</a:t>
+              <a:t>Users have two forms to choose from. One for infants and one for toddlers.</a:t>
+            </a:r>
+          </a:p>
+          <a:p>
+            <a:pPr marL="0" lvl="0" indent="0">
+              <a:spcBef>
+                <a:spcPts val="0"/>
+              </a:spcBef>
+              <a:buNone/>
+            </a:pPr>
+            <a:r>
+              <a:rPr lang="en-US" dirty="0"/>
+              <a:t>Users can fill out a daily log each day for all students.</a:t>
             </a:r>
           </a:p>
           <a:p>
@@ -6102,19 +6125,31 @@
             </a:pPr>
             <a:r>
               <a:rPr lang="en-US" dirty="0"/>
-              <a:t>I’m creating 4 databases and labeling them Classroom, Student, and Form. The Classroom database contains an ID number and classroom name. The student database contains an ID number, the students name, The </a:t>
+              <a:t>I’m creating multiple databases. My main databases are Classroom, Student, </a:t>
             </a:r>
             <a:r>
               <a:rPr lang="en-US" dirty="0" err="1"/>
-              <a:t>ClassroomStudent</a:t>
+              <a:t>MealDescription</a:t>
             </a:r>
             <a:r>
               <a:rPr lang="en-US" dirty="0"/>
-              <a:t> database will contain the Classroom ID and Student </a:t>
+              <a:t>, and </a:t>
             </a:r>
             <a:r>
-              <a:rPr lang="en-US"/>
-              <a:t>ID. </a:t>
+              <a:rPr lang="en-US" dirty="0" err="1"/>
+              <a:t>BottleFeeding</a:t>
+            </a:r>
+            <a:r>
+              <a:rPr lang="en-US" dirty="0"/>
+              <a:t>. These will hold majority of the information needed to fill out the forms. I will also have some smaller databases to hold information regarding </a:t>
+            </a:r>
+            <a:r>
+              <a:rPr lang="en-US" dirty="0" err="1"/>
+              <a:t>MealTimes</a:t>
+            </a:r>
+            <a:r>
+              <a:rPr lang="en-US" dirty="0"/>
+              <a:t>, Food Amounts.</a:t>
             </a:r>
             <a:endParaRPr lang="en" dirty="0"/>
           </a:p>
@@ -6219,9 +6254,10 @@
               <a:buChar char="●"/>
             </a:pPr>
             <a:r>
-              <a:rPr lang="en" dirty="0"/>
-              <a:t>Language</a:t>
+              <a:rPr lang="en-US" dirty="0"/>
+              <a:t>C#</a:t>
             </a:r>
+            <a:endParaRPr lang="en" dirty="0"/>
           </a:p>
           <a:p>
             <a:pPr marL="457200" lvl="0" indent="-342900" rtl="0">
@@ -6235,9 +6271,10 @@
               <a:buChar char="●"/>
             </a:pPr>
             <a:r>
-              <a:rPr lang="en" dirty="0"/>
-              <a:t>Framework</a:t>
+              <a:rPr lang="en-US" dirty="0" err="1"/>
+              <a:t>EntityFramework</a:t>
             </a:r>
+            <a:endParaRPr lang="en" dirty="0"/>
           </a:p>
           <a:p>
             <a:pPr marL="457200" lvl="0" indent="-342900" rtl="0">
@@ -6251,9 +6288,10 @@
               <a:buChar char="●"/>
             </a:pPr>
             <a:r>
-              <a:rPr lang="en" dirty="0"/>
-              <a:t>Template engine</a:t>
+              <a:rPr lang="en-US" dirty="0"/>
+              <a:t>Razor</a:t>
             </a:r>
+            <a:endParaRPr lang="en" dirty="0"/>
           </a:p>
           <a:p>
             <a:pPr marL="457200" lvl="0" indent="-342900" rtl="0">
@@ -6267,22 +6305,10 @@
               <a:buChar char="●"/>
             </a:pPr>
             <a:r>
-              <a:rPr lang="en" dirty="0"/>
-              <a:t>Database engine</a:t>
+              <a:rPr lang="en-US" dirty="0"/>
+              <a:t>SQL</a:t>
             </a:r>
-          </a:p>
-          <a:p>
-            <a:pPr marL="457200" lvl="0" indent="-342900">
-              <a:spcBef>
-                <a:spcPts val="0"/>
-              </a:spcBef>
-              <a:buSzPts val="1800"/>
-              <a:buChar char="●"/>
-            </a:pPr>
-            <a:r>
-              <a:rPr lang="en" dirty="0"/>
-              <a:t>Other libraries or components</a:t>
-            </a:r>
+            <a:endParaRPr lang="en" dirty="0"/>
           </a:p>
         </p:txBody>
       </p:sp>
@@ -6582,8 +6608,8 @@
               <a:buChar char="●"/>
             </a:pPr>
             <a:r>
-              <a:rPr lang="en" dirty="0"/>
-              <a:t>Another feature</a:t>
+              <a:rPr lang="en-US" dirty="0"/>
+              <a:t>I want to add a Login Feature for teachers and parents</a:t>
             </a:r>
           </a:p>
           <a:p>
@@ -6598,22 +6624,10 @@
               <a:buChar char="●"/>
             </a:pPr>
             <a:r>
-              <a:rPr lang="en" dirty="0"/>
-              <a:t>Maybe snazzing up the UI</a:t>
+              <a:rPr lang="en-US" dirty="0"/>
+              <a:t>Add images of students and more of their personal information</a:t>
             </a:r>
-          </a:p>
-          <a:p>
-            <a:pPr marL="457200" lvl="0" indent="-342900">
-              <a:spcBef>
-                <a:spcPts val="0"/>
-              </a:spcBef>
-              <a:buSzPts val="1800"/>
-              <a:buChar char="●"/>
-            </a:pPr>
-            <a:r>
-              <a:rPr lang="en" dirty="0"/>
-              <a:t>Learning something else new!</a:t>
-            </a:r>
+            <a:endParaRPr lang="en" dirty="0"/>
           </a:p>
         </p:txBody>
       </p:sp>

</xml_diff>